<commit_message>
finishing touches on prez
</commit_message>
<xml_diff>
--- a/prezentáció/Típushelyes cachelés.pptx
+++ b/prezentáció/Típushelyes cachelés.pptx
@@ -30200,6 +30200,842 @@
           </a:p>
         </p:txBody>
       </p:sp>
+      <p:sp>
+        <p:nvSpPr>
+          <p:cNvPr id="5" name="Rectangle 1">
+            <a:extLst>
+              <a:ext uri="{FF2B5EF4-FFF2-40B4-BE49-F238E27FC236}">
+                <a16:creationId xmlns:a16="http://schemas.microsoft.com/office/drawing/2014/main" id="{21CC34CA-3044-3774-1599-AA2A9A51CEE0}"/>
+              </a:ext>
+            </a:extLst>
+          </p:cNvPr>
+          <p:cNvSpPr>
+            <a:spLocks noChangeArrowheads="1"/>
+          </p:cNvSpPr>
+          <p:nvPr/>
+        </p:nvSpPr>
+        <p:spPr bwMode="auto">
+          <a:xfrm>
+            <a:off x="2124801" y="2635911"/>
+            <a:ext cx="8003357" cy="3477875"/>
+          </a:xfrm>
+          <a:prstGeom prst="rect">
+            <a:avLst/>
+          </a:prstGeom>
+          <a:solidFill>
+            <a:srgbClr val="232425"/>
+          </a:solidFill>
+          <a:ln>
+            <a:noFill/>
+          </a:ln>
+          <a:effectLst/>
+          <a:extLst>
+            <a:ext uri="{91240B29-F687-4F45-9708-019B960494DF}">
+              <a14:hiddenLine xmlns:a14="http://schemas.microsoft.com/office/drawing/2010/main" w="9525">
+                <a:solidFill>
+                  <a:schemeClr val="tx1"/>
+                </a:solidFill>
+                <a:miter lim="800000"/>
+                <a:headEnd/>
+                <a:tailEnd/>
+              </a14:hiddenLine>
+            </a:ext>
+            <a:ext uri="{AF507438-7753-43E0-B8FC-AC1667EBCBE1}">
+              <a14:hiddenEffects xmlns:a14="http://schemas.microsoft.com/office/drawing/2010/main">
+                <a:effectLst>
+                  <a:outerShdw dist="35921" dir="2700000" algn="ctr" rotWithShape="0">
+                    <a:schemeClr val="bg2"/>
+                  </a:outerShdw>
+                </a:effectLst>
+              </a14:hiddenEffects>
+            </a:ext>
+          </a:extLst>
+        </p:spPr>
+        <p:txBody>
+          <a:bodyPr vert="horz" wrap="square" lIns="91440" tIns="45720" rIns="91440" bIns="45720" numCol="1" anchor="ctr" anchorCtr="0" compatLnSpc="1">
+            <a:prstTxWarp prst="textNoShape">
+              <a:avLst/>
+            </a:prstTxWarp>
+            <a:spAutoFit/>
+          </a:bodyPr>
+          <a:lstStyle/>
+          <a:p>
+            <a:pPr marL="0" marR="0" lvl="0" indent="0" algn="l" defTabSz="914400" rtl="0" eaLnBrk="0" fontAlgn="base" latinLnBrk="0" hangingPunct="0">
+              <a:lnSpc>
+                <a:spcPct val="100000"/>
+              </a:lnSpc>
+              <a:spcBef>
+                <a:spcPct val="0"/>
+              </a:spcBef>
+              <a:spcAft>
+                <a:spcPct val="0"/>
+              </a:spcAft>
+              <a:buClrTx/>
+              <a:buSzTx/>
+              <a:buFontTx/>
+              <a:buNone/>
+              <a:tabLst/>
+            </a:pPr>
+            <a:r>
+              <a:rPr lang="hu-HU" altLang="hu-HU" sz="2000" dirty="0" err="1">
+                <a:solidFill>
+                  <a:srgbClr val="A17C5D"/>
+                </a:solidFill>
+                <a:latin typeface="IBM Plex Mono" panose="020B0509050203000203" pitchFamily="49" charset="0"/>
+              </a:rPr>
+              <a:t>struct</a:t>
+            </a:r>
+            <a:r>
+              <a:rPr kumimoji="0" lang="hu-HU" altLang="hu-HU" sz="2000" b="0" i="0" u="none" strike="noStrike" cap="none" normalizeH="0" baseline="0" dirty="0">
+                <a:ln>
+                  <a:noFill/>
+                </a:ln>
+                <a:solidFill>
+                  <a:srgbClr val="CC7832"/>
+                </a:solidFill>
+                <a:effectLst/>
+                <a:latin typeface="IBM Plex Mono" panose="020B0509050203000203" pitchFamily="49" charset="0"/>
+              </a:rPr>
+              <a:t> </a:t>
+            </a:r>
+            <a:r>
+              <a:rPr lang="hu-HU" altLang="hu-HU" sz="2000" dirty="0" err="1">
+                <a:solidFill>
+                  <a:srgbClr val="B5B6E3"/>
+                </a:solidFill>
+                <a:latin typeface="IBM Plex Mono" panose="020B0509050203000203" pitchFamily="49" charset="0"/>
+              </a:rPr>
+              <a:t>visitor_base</a:t>
+            </a:r>
+            <a:r>
+              <a:rPr lang="hu-HU" altLang="hu-HU" sz="2000" dirty="0">
+                <a:solidFill>
+                  <a:srgbClr val="B5B6E3"/>
+                </a:solidFill>
+                <a:latin typeface="IBM Plex Mono" panose="020B0509050203000203" pitchFamily="49" charset="0"/>
+              </a:rPr>
+              <a:t> {</a:t>
+            </a:r>
+            <a:br>
+              <a:rPr kumimoji="0" lang="hu-HU" altLang="hu-HU" sz="2000" b="0" i="0" u="none" strike="noStrike" cap="none" normalizeH="0" baseline="0" dirty="0">
+                <a:ln>
+                  <a:noFill/>
+                </a:ln>
+                <a:solidFill>
+                  <a:srgbClr val="CFD2D5"/>
+                </a:solidFill>
+                <a:effectLst/>
+                <a:latin typeface="IBM Plex Mono" panose="020B0509050203000203" pitchFamily="49" charset="0"/>
+              </a:rPr>
+            </a:br>
+            <a:r>
+              <a:rPr kumimoji="0" lang="hu-HU" altLang="hu-HU" sz="2000" b="0" i="0" u="none" strike="noStrike" cap="none" normalizeH="0" baseline="0" dirty="0">
+                <a:ln>
+                  <a:noFill/>
+                </a:ln>
+                <a:solidFill>
+                  <a:srgbClr val="CFD2D5"/>
+                </a:solidFill>
+                <a:effectLst/>
+                <a:latin typeface="IBM Plex Mono" panose="020B0509050203000203" pitchFamily="49" charset="0"/>
+              </a:rPr>
+              <a:t>    </a:t>
+            </a:r>
+            <a:r>
+              <a:rPr lang="hu-HU" altLang="hu-HU" sz="2000" dirty="0" err="1">
+                <a:solidFill>
+                  <a:srgbClr val="A17C5D"/>
+                </a:solidFill>
+                <a:latin typeface="IBM Plex Mono" panose="020B0509050203000203" pitchFamily="49" charset="0"/>
+              </a:rPr>
+              <a:t>virtual</a:t>
+            </a:r>
+            <a:r>
+              <a:rPr kumimoji="0" lang="hu-HU" altLang="hu-HU" sz="2000" b="0" i="0" u="none" strike="noStrike" cap="none" normalizeH="0" baseline="0" dirty="0">
+                <a:ln>
+                  <a:noFill/>
+                </a:ln>
+                <a:solidFill>
+                  <a:srgbClr val="CC7832"/>
+                </a:solidFill>
+                <a:effectLst/>
+                <a:latin typeface="IBM Plex Mono" panose="020B0509050203000203" pitchFamily="49" charset="0"/>
+              </a:rPr>
+              <a:t> </a:t>
+            </a:r>
+            <a:r>
+              <a:rPr lang="hu-HU" altLang="hu-HU" sz="2000" dirty="0">
+                <a:solidFill>
+                  <a:srgbClr val="D3BD99"/>
+                </a:solidFill>
+                <a:latin typeface="IBM Plex Mono" panose="020B0509050203000203" pitchFamily="49" charset="0"/>
+              </a:rPr>
+              <a:t>~</a:t>
+            </a:r>
+            <a:r>
+              <a:rPr lang="hu-HU" altLang="hu-HU" sz="2000" dirty="0" err="1">
+                <a:solidFill>
+                  <a:srgbClr val="D3BD99"/>
+                </a:solidFill>
+                <a:latin typeface="IBM Plex Mono" panose="020B0509050203000203" pitchFamily="49" charset="0"/>
+              </a:rPr>
+              <a:t>visitor_base</a:t>
+            </a:r>
+            <a:r>
+              <a:rPr lang="hu-HU" altLang="hu-HU" sz="2000" dirty="0">
+                <a:solidFill>
+                  <a:srgbClr val="B5B6E3"/>
+                </a:solidFill>
+                <a:latin typeface="IBM Plex Mono" panose="020B0509050203000203" pitchFamily="49" charset="0"/>
+              </a:rPr>
+              <a:t>() = </a:t>
+            </a:r>
+            <a:r>
+              <a:rPr lang="hu-HU" altLang="hu-HU" sz="2000" dirty="0" err="1">
+                <a:solidFill>
+                  <a:srgbClr val="A17C5D"/>
+                </a:solidFill>
+                <a:latin typeface="IBM Plex Mono" panose="020B0509050203000203" pitchFamily="49" charset="0"/>
+              </a:rPr>
+              <a:t>default</a:t>
+            </a:r>
+            <a:r>
+              <a:rPr kumimoji="0" lang="hu-HU" altLang="hu-HU" sz="2000" b="0" i="0" u="none" strike="noStrike" cap="none" normalizeH="0" baseline="0" dirty="0">
+                <a:ln>
+                  <a:noFill/>
+                </a:ln>
+                <a:solidFill>
+                  <a:srgbClr val="CC7832"/>
+                </a:solidFill>
+                <a:effectLst/>
+                <a:latin typeface="IBM Plex Mono" panose="020B0509050203000203" pitchFamily="49" charset="0"/>
+              </a:rPr>
+              <a:t>; </a:t>
+            </a:r>
+            <a:br>
+              <a:rPr kumimoji="0" lang="hu-HU" altLang="hu-HU" sz="2000" b="0" i="0" u="none" strike="noStrike" cap="none" normalizeH="0" baseline="0" dirty="0">
+                <a:ln>
+                  <a:noFill/>
+                </a:ln>
+                <a:solidFill>
+                  <a:srgbClr val="CC7832"/>
+                </a:solidFill>
+                <a:effectLst/>
+                <a:latin typeface="IBM Plex Mono" panose="020B0509050203000203" pitchFamily="49" charset="0"/>
+              </a:rPr>
+            </a:br>
+            <a:r>
+              <a:rPr lang="hu-HU" altLang="hu-HU" sz="2000" dirty="0">
+                <a:solidFill>
+                  <a:srgbClr val="B5B6E3"/>
+                </a:solidFill>
+                <a:latin typeface="IBM Plex Mono" panose="020B0509050203000203" pitchFamily="49" charset="0"/>
+              </a:rPr>
+              <a:t>}</a:t>
+            </a:r>
+            <a:r>
+              <a:rPr kumimoji="0" lang="hu-HU" altLang="hu-HU" sz="2000" b="0" i="0" u="none" strike="noStrike" cap="none" normalizeH="0" baseline="0" dirty="0">
+                <a:ln>
+                  <a:noFill/>
+                </a:ln>
+                <a:solidFill>
+                  <a:srgbClr val="CC7832"/>
+                </a:solidFill>
+                <a:effectLst/>
+                <a:latin typeface="IBM Plex Mono" panose="020B0509050203000203" pitchFamily="49" charset="0"/>
+              </a:rPr>
+              <a:t>;</a:t>
+            </a:r>
+            <a:br>
+              <a:rPr kumimoji="0" lang="hu-HU" altLang="hu-HU" sz="2000" b="0" i="0" u="none" strike="noStrike" cap="none" normalizeH="0" baseline="0" dirty="0">
+                <a:ln>
+                  <a:noFill/>
+                </a:ln>
+                <a:solidFill>
+                  <a:srgbClr val="CC7832"/>
+                </a:solidFill>
+                <a:effectLst/>
+                <a:latin typeface="IBM Plex Mono" panose="020B0509050203000203" pitchFamily="49" charset="0"/>
+              </a:rPr>
+            </a:br>
+            <a:br>
+              <a:rPr kumimoji="0" lang="hu-HU" altLang="hu-HU" sz="2000" b="0" i="0" u="none" strike="noStrike" cap="none" normalizeH="0" baseline="0" dirty="0">
+                <a:ln>
+                  <a:noFill/>
+                </a:ln>
+                <a:solidFill>
+                  <a:srgbClr val="808080"/>
+                </a:solidFill>
+                <a:effectLst/>
+                <a:latin typeface="IBM Plex Mono" panose="020B0509050203000203" pitchFamily="49" charset="0"/>
+              </a:rPr>
+            </a:br>
+            <a:r>
+              <a:rPr lang="hu-HU" altLang="hu-HU" sz="2000" dirty="0" err="1">
+                <a:solidFill>
+                  <a:srgbClr val="A17C5D"/>
+                </a:solidFill>
+                <a:latin typeface="IBM Plex Mono" panose="020B0509050203000203" pitchFamily="49" charset="0"/>
+              </a:rPr>
+              <a:t>template</a:t>
+            </a:r>
+            <a:r>
+              <a:rPr lang="hu-HU" altLang="hu-HU" sz="2000" dirty="0">
+                <a:solidFill>
+                  <a:srgbClr val="B5B6E3"/>
+                </a:solidFill>
+                <a:latin typeface="IBM Plex Mono" panose="020B0509050203000203" pitchFamily="49" charset="0"/>
+              </a:rPr>
+              <a:t>&lt;</a:t>
+            </a:r>
+            <a:r>
+              <a:rPr lang="hu-HU" altLang="hu-HU" sz="2000" dirty="0" err="1">
+                <a:solidFill>
+                  <a:srgbClr val="A17C5D"/>
+                </a:solidFill>
+                <a:latin typeface="IBM Plex Mono" panose="020B0509050203000203" pitchFamily="49" charset="0"/>
+              </a:rPr>
+              <a:t>class</a:t>
+            </a:r>
+            <a:r>
+              <a:rPr kumimoji="0" lang="hu-HU" altLang="hu-HU" sz="2000" b="0" i="0" u="none" strike="noStrike" cap="none" normalizeH="0" baseline="0" dirty="0">
+                <a:ln>
+                  <a:noFill/>
+                </a:ln>
+                <a:solidFill>
+                  <a:srgbClr val="CC7832"/>
+                </a:solidFill>
+                <a:effectLst/>
+                <a:latin typeface="IBM Plex Mono" panose="020B0509050203000203" pitchFamily="49" charset="0"/>
+              </a:rPr>
+              <a:t> </a:t>
+            </a:r>
+            <a:r>
+              <a:rPr lang="hu-HU" altLang="hu-HU" sz="2000" dirty="0">
+                <a:solidFill>
+                  <a:srgbClr val="B5B6E3"/>
+                </a:solidFill>
+                <a:latin typeface="IBM Plex Mono" panose="020B0509050203000203" pitchFamily="49" charset="0"/>
+              </a:rPr>
+              <a:t>T&gt;</a:t>
+            </a:r>
+            <a:br>
+              <a:rPr kumimoji="0" lang="hu-HU" altLang="hu-HU" sz="2000" b="0" i="0" u="none" strike="noStrike" cap="none" normalizeH="0" baseline="0" dirty="0">
+                <a:ln>
+                  <a:noFill/>
+                </a:ln>
+                <a:solidFill>
+                  <a:srgbClr val="CFD2D5"/>
+                </a:solidFill>
+                <a:effectLst/>
+                <a:latin typeface="IBM Plex Mono" panose="020B0509050203000203" pitchFamily="49" charset="0"/>
+              </a:rPr>
+            </a:br>
+            <a:r>
+              <a:rPr lang="hu-HU" altLang="hu-HU" sz="2000" dirty="0" err="1">
+                <a:solidFill>
+                  <a:srgbClr val="A17C5D"/>
+                </a:solidFill>
+                <a:latin typeface="IBM Plex Mono" panose="020B0509050203000203" pitchFamily="49" charset="0"/>
+              </a:rPr>
+              <a:t>struct</a:t>
+            </a:r>
+            <a:r>
+              <a:rPr kumimoji="0" lang="hu-HU" altLang="hu-HU" sz="2000" b="0" i="0" u="none" strike="noStrike" cap="none" normalizeH="0" baseline="0" dirty="0">
+                <a:ln>
+                  <a:noFill/>
+                </a:ln>
+                <a:solidFill>
+                  <a:srgbClr val="CC7832"/>
+                </a:solidFill>
+                <a:effectLst/>
+                <a:latin typeface="IBM Plex Mono" panose="020B0509050203000203" pitchFamily="49" charset="0"/>
+              </a:rPr>
+              <a:t> </a:t>
+            </a:r>
+            <a:r>
+              <a:rPr lang="hu-HU" altLang="hu-HU" sz="2000" dirty="0" err="1">
+                <a:solidFill>
+                  <a:srgbClr val="B5B6E3"/>
+                </a:solidFill>
+                <a:latin typeface="IBM Plex Mono" panose="020B0509050203000203" pitchFamily="49" charset="0"/>
+              </a:rPr>
+              <a:t>visitor_impl</a:t>
+            </a:r>
+            <a:r>
+              <a:rPr lang="hu-HU" altLang="hu-HU" sz="2000" dirty="0">
+                <a:solidFill>
+                  <a:srgbClr val="B5B6E3"/>
+                </a:solidFill>
+                <a:latin typeface="IBM Plex Mono" panose="020B0509050203000203" pitchFamily="49" charset="0"/>
+              </a:rPr>
+              <a:t> </a:t>
+            </a:r>
+            <a:r>
+              <a:rPr kumimoji="0" lang="hu-HU" altLang="hu-HU" sz="2000" b="0" i="0" u="none" strike="noStrike" cap="none" normalizeH="0" baseline="0" dirty="0">
+                <a:ln>
+                  <a:noFill/>
+                </a:ln>
+                <a:solidFill>
+                  <a:srgbClr val="CFD2D5"/>
+                </a:solidFill>
+                <a:effectLst/>
+                <a:latin typeface="IBM Plex Mono" panose="020B0509050203000203" pitchFamily="49" charset="0"/>
+              </a:rPr>
+              <a:t>: </a:t>
+            </a:r>
+            <a:r>
+              <a:rPr lang="hu-HU" altLang="hu-HU" sz="2000" dirty="0" err="1">
+                <a:solidFill>
+                  <a:srgbClr val="A17C5D"/>
+                </a:solidFill>
+                <a:latin typeface="IBM Plex Mono" panose="020B0509050203000203" pitchFamily="49" charset="0"/>
+              </a:rPr>
+              <a:t>virtual</a:t>
+            </a:r>
+            <a:r>
+              <a:rPr kumimoji="0" lang="hu-HU" altLang="hu-HU" sz="2000" b="0" i="0" u="none" strike="noStrike" cap="none" normalizeH="0" baseline="0" dirty="0">
+                <a:ln>
+                  <a:noFill/>
+                </a:ln>
+                <a:solidFill>
+                  <a:srgbClr val="CC7832"/>
+                </a:solidFill>
+                <a:effectLst/>
+                <a:latin typeface="IBM Plex Mono" panose="020B0509050203000203" pitchFamily="49" charset="0"/>
+              </a:rPr>
+              <a:t> </a:t>
+            </a:r>
+            <a:r>
+              <a:rPr lang="hu-HU" altLang="hu-HU" sz="2000" dirty="0" err="1">
+                <a:solidFill>
+                  <a:srgbClr val="B5B6E3"/>
+                </a:solidFill>
+                <a:latin typeface="IBM Plex Mono" panose="020B0509050203000203" pitchFamily="49" charset="0"/>
+              </a:rPr>
+              <a:t>visitor_base</a:t>
+            </a:r>
+            <a:r>
+              <a:rPr lang="hu-HU" altLang="hu-HU" sz="2000" dirty="0">
+                <a:solidFill>
+                  <a:srgbClr val="B5B6E3"/>
+                </a:solidFill>
+                <a:latin typeface="IBM Plex Mono" panose="020B0509050203000203" pitchFamily="49" charset="0"/>
+              </a:rPr>
+              <a:t> {</a:t>
+            </a:r>
+            <a:br>
+              <a:rPr lang="hu-HU" altLang="hu-HU" sz="2000" dirty="0">
+                <a:solidFill>
+                  <a:srgbClr val="B5B6E3"/>
+                </a:solidFill>
+                <a:latin typeface="IBM Plex Mono" panose="020B0509050203000203" pitchFamily="49" charset="0"/>
+              </a:rPr>
+            </a:br>
+            <a:r>
+              <a:rPr kumimoji="0" lang="hu-HU" altLang="hu-HU" sz="2000" b="0" i="0" u="none" strike="noStrike" cap="none" normalizeH="0" baseline="0" dirty="0">
+                <a:ln>
+                  <a:noFill/>
+                </a:ln>
+                <a:solidFill>
+                  <a:srgbClr val="808080"/>
+                </a:solidFill>
+                <a:effectLst/>
+                <a:latin typeface="IBM Plex Mono" panose="020B0509050203000203" pitchFamily="49" charset="0"/>
+              </a:rPr>
+              <a:t>    </a:t>
+            </a:r>
+            <a:r>
+              <a:rPr lang="hu-HU" altLang="hu-HU" sz="2000" dirty="0" err="1">
+                <a:solidFill>
+                  <a:srgbClr val="A17C5D"/>
+                </a:solidFill>
+                <a:latin typeface="IBM Plex Mono" panose="020B0509050203000203" pitchFamily="49" charset="0"/>
+              </a:rPr>
+              <a:t>virtual</a:t>
+            </a:r>
+            <a:r>
+              <a:rPr kumimoji="0" lang="hu-HU" altLang="hu-HU" sz="2000" b="0" i="0" u="none" strike="noStrike" cap="none" normalizeH="0" baseline="0" dirty="0">
+                <a:ln>
+                  <a:noFill/>
+                </a:ln>
+                <a:solidFill>
+                  <a:srgbClr val="CC7832"/>
+                </a:solidFill>
+                <a:effectLst/>
+                <a:latin typeface="IBM Plex Mono" panose="020B0509050203000203" pitchFamily="49" charset="0"/>
+              </a:rPr>
+              <a:t> </a:t>
+            </a:r>
+            <a:r>
+              <a:rPr lang="hu-HU" altLang="hu-HU" sz="2000" dirty="0" err="1">
+                <a:solidFill>
+                  <a:srgbClr val="A17C5D"/>
+                </a:solidFill>
+                <a:latin typeface="IBM Plex Mono" panose="020B0509050203000203" pitchFamily="49" charset="0"/>
+              </a:rPr>
+              <a:t>void</a:t>
+            </a:r>
+            <a:r>
+              <a:rPr kumimoji="0" lang="hu-HU" altLang="hu-HU" sz="2000" b="0" i="0" u="none" strike="noStrike" cap="none" normalizeH="0" baseline="0" dirty="0">
+                <a:ln>
+                  <a:noFill/>
+                </a:ln>
+                <a:solidFill>
+                  <a:srgbClr val="CC7832"/>
+                </a:solidFill>
+                <a:effectLst/>
+                <a:latin typeface="IBM Plex Mono" panose="020B0509050203000203" pitchFamily="49" charset="0"/>
+              </a:rPr>
+              <a:t> </a:t>
+            </a:r>
+            <a:r>
+              <a:rPr kumimoji="0" lang="hu-HU" altLang="hu-HU" sz="2000" b="1" i="1" u="none" strike="noStrike" cap="none" normalizeH="0" baseline="0" dirty="0" err="1">
+                <a:ln>
+                  <a:noFill/>
+                </a:ln>
+                <a:solidFill>
+                  <a:srgbClr val="FFC66D"/>
+                </a:solidFill>
+                <a:effectLst/>
+                <a:highlight>
+                  <a:srgbClr val="000000"/>
+                </a:highlight>
+                <a:latin typeface="IBM Plex Mono" panose="020B0509050203000203" pitchFamily="49" charset="0"/>
+              </a:rPr>
+              <a:t>do_visit</a:t>
+            </a:r>
+            <a:r>
+              <a:rPr kumimoji="0" lang="hu-HU" altLang="hu-HU" sz="2000" b="1" i="1" u="none" strike="noStrike" cap="none" normalizeH="0" baseline="0" dirty="0">
+                <a:ln>
+                  <a:noFill/>
+                </a:ln>
+                <a:solidFill>
+                  <a:srgbClr val="CFD2D5"/>
+                </a:solidFill>
+                <a:effectLst/>
+                <a:highlight>
+                  <a:srgbClr val="000000"/>
+                </a:highlight>
+                <a:latin typeface="IBM Plex Mono" panose="020B0509050203000203" pitchFamily="49" charset="0"/>
+              </a:rPr>
+              <a:t>(</a:t>
+            </a:r>
+            <a:r>
+              <a:rPr kumimoji="0" lang="hu-HU" altLang="hu-HU" sz="2000" b="1" i="1" u="none" strike="noStrike" cap="none" normalizeH="0" baseline="0" dirty="0">
+                <a:ln>
+                  <a:noFill/>
+                </a:ln>
+                <a:solidFill>
+                  <a:srgbClr val="B9BCD1"/>
+                </a:solidFill>
+                <a:effectLst/>
+                <a:highlight>
+                  <a:srgbClr val="000000"/>
+                </a:highlight>
+                <a:latin typeface="IBM Plex Mono" panose="020B0509050203000203" pitchFamily="49" charset="0"/>
+              </a:rPr>
+              <a:t>T</a:t>
+            </a:r>
+            <a:r>
+              <a:rPr kumimoji="0" lang="hu-HU" altLang="hu-HU" sz="2000" b="1" i="1" u="none" strike="noStrike" cap="none" normalizeH="0" baseline="0" dirty="0">
+                <a:ln>
+                  <a:noFill/>
+                </a:ln>
+                <a:solidFill>
+                  <a:srgbClr val="CFD2D5"/>
+                </a:solidFill>
+                <a:effectLst/>
+                <a:highlight>
+                  <a:srgbClr val="000000"/>
+                </a:highlight>
+                <a:latin typeface="IBM Plex Mono" panose="020B0509050203000203" pitchFamily="49" charset="0"/>
+              </a:rPr>
+              <a:t>*)</a:t>
+            </a:r>
+            <a:r>
+              <a:rPr kumimoji="0" lang="hu-HU" altLang="hu-HU" sz="2000" b="0" i="0" u="none" strike="noStrike" cap="none" normalizeH="0" baseline="0" dirty="0">
+                <a:ln>
+                  <a:noFill/>
+                </a:ln>
+                <a:solidFill>
+                  <a:srgbClr val="CFD2D5"/>
+                </a:solidFill>
+                <a:effectLst/>
+                <a:latin typeface="IBM Plex Mono" panose="020B0509050203000203" pitchFamily="49" charset="0"/>
+              </a:rPr>
+              <a:t> </a:t>
+            </a:r>
+            <a:r>
+              <a:rPr lang="hu-HU" altLang="hu-HU" sz="2000" dirty="0">
+                <a:solidFill>
+                  <a:srgbClr val="B5B6E3"/>
+                </a:solidFill>
+                <a:latin typeface="IBM Plex Mono" panose="020B0509050203000203" pitchFamily="49" charset="0"/>
+              </a:rPr>
+              <a:t>=</a:t>
+            </a:r>
+            <a:r>
+              <a:rPr kumimoji="0" lang="hu-HU" altLang="hu-HU" sz="2000" b="0" i="0" u="none" strike="noStrike" cap="none" normalizeH="0" baseline="0" dirty="0">
+                <a:ln>
+                  <a:noFill/>
+                </a:ln>
+                <a:solidFill>
+                  <a:srgbClr val="CFD2D5"/>
+                </a:solidFill>
+                <a:effectLst/>
+                <a:latin typeface="IBM Plex Mono" panose="020B0509050203000203" pitchFamily="49" charset="0"/>
+              </a:rPr>
+              <a:t> </a:t>
+            </a:r>
+            <a:r>
+              <a:rPr kumimoji="0" lang="hu-HU" altLang="hu-HU" sz="2000" b="0" i="0" u="none" strike="noStrike" cap="none" normalizeH="0" baseline="0" dirty="0">
+                <a:ln>
+                  <a:noFill/>
+                </a:ln>
+                <a:solidFill>
+                  <a:srgbClr val="6897BB"/>
+                </a:solidFill>
+                <a:effectLst/>
+                <a:latin typeface="IBM Plex Mono" panose="020B0509050203000203" pitchFamily="49" charset="0"/>
+              </a:rPr>
+              <a:t>0</a:t>
+            </a:r>
+            <a:r>
+              <a:rPr kumimoji="0" lang="hu-HU" altLang="hu-HU" sz="2000" b="0" i="0" u="none" strike="noStrike" cap="none" normalizeH="0" baseline="0" dirty="0">
+                <a:ln>
+                  <a:noFill/>
+                </a:ln>
+                <a:solidFill>
+                  <a:srgbClr val="CC7832"/>
+                </a:solidFill>
+                <a:effectLst/>
+                <a:latin typeface="IBM Plex Mono" panose="020B0509050203000203" pitchFamily="49" charset="0"/>
+              </a:rPr>
+              <a:t>;</a:t>
+            </a:r>
+            <a:br>
+              <a:rPr kumimoji="0" lang="hu-HU" altLang="hu-HU" sz="2000" b="0" i="0" u="none" strike="noStrike" cap="none" normalizeH="0" baseline="0" dirty="0">
+                <a:ln>
+                  <a:noFill/>
+                </a:ln>
+                <a:solidFill>
+                  <a:srgbClr val="CC7832"/>
+                </a:solidFill>
+                <a:effectLst/>
+                <a:latin typeface="IBM Plex Mono" panose="020B0509050203000203" pitchFamily="49" charset="0"/>
+              </a:rPr>
+            </a:br>
+            <a:br>
+              <a:rPr kumimoji="0" lang="hu-HU" altLang="hu-HU" sz="2000" b="0" i="0" u="none" strike="noStrike" cap="none" normalizeH="0" baseline="0" dirty="0">
+                <a:ln>
+                  <a:noFill/>
+                </a:ln>
+                <a:solidFill>
+                  <a:srgbClr val="CC7832"/>
+                </a:solidFill>
+                <a:effectLst/>
+                <a:latin typeface="IBM Plex Mono" panose="020B0509050203000203" pitchFamily="49" charset="0"/>
+              </a:rPr>
+            </a:br>
+            <a:r>
+              <a:rPr lang="hu-HU" altLang="hu-HU" sz="2000" dirty="0" err="1">
+                <a:solidFill>
+                  <a:srgbClr val="A17C5D"/>
+                </a:solidFill>
+                <a:latin typeface="IBM Plex Mono" panose="020B0509050203000203" pitchFamily="49" charset="0"/>
+              </a:rPr>
+              <a:t>protected</a:t>
+            </a:r>
+            <a:r>
+              <a:rPr kumimoji="0" lang="hu-HU" altLang="hu-HU" sz="2000" b="0" i="0" u="none" strike="noStrike" cap="none" normalizeH="0" baseline="0" dirty="0">
+                <a:ln>
+                  <a:noFill/>
+                </a:ln>
+                <a:solidFill>
+                  <a:srgbClr val="CFD2D5"/>
+                </a:solidFill>
+                <a:effectLst/>
+                <a:latin typeface="IBM Plex Mono" panose="020B0509050203000203" pitchFamily="49" charset="0"/>
+              </a:rPr>
+              <a:t>:</a:t>
+            </a:r>
+            <a:r>
+              <a:rPr lang="hu-HU" altLang="hu-HU" sz="2000" dirty="0">
+                <a:solidFill>
+                  <a:srgbClr val="CFD2D5"/>
+                </a:solidFill>
+                <a:latin typeface="IBM Plex Mono" panose="020B0509050203000203" pitchFamily="49" charset="0"/>
+              </a:rPr>
+              <a:t> </a:t>
+            </a:r>
+          </a:p>
+          <a:p>
+            <a:pPr marL="0" marR="0" lvl="0" indent="0" algn="l" defTabSz="914400" rtl="0" eaLnBrk="0" fontAlgn="base" latinLnBrk="0" hangingPunct="0">
+              <a:lnSpc>
+                <a:spcPct val="100000"/>
+              </a:lnSpc>
+              <a:spcBef>
+                <a:spcPct val="0"/>
+              </a:spcBef>
+              <a:spcAft>
+                <a:spcPct val="0"/>
+              </a:spcAft>
+              <a:buClrTx/>
+              <a:buSzTx/>
+              <a:buFontTx/>
+              <a:buNone/>
+              <a:tabLst/>
+            </a:pPr>
+            <a:r>
+              <a:rPr lang="hu-HU" altLang="hu-HU" sz="2000" dirty="0">
+                <a:solidFill>
+                  <a:srgbClr val="CFD2D5"/>
+                </a:solidFill>
+                <a:latin typeface="IBM Plex Mono" panose="020B0509050203000203" pitchFamily="49" charset="0"/>
+              </a:rPr>
+              <a:t>    </a:t>
+            </a:r>
+            <a:r>
+              <a:rPr lang="hu-HU" altLang="hu-HU" sz="2000" dirty="0">
+                <a:solidFill>
+                  <a:srgbClr val="D3BD99"/>
+                </a:solidFill>
+                <a:latin typeface="IBM Plex Mono" panose="020B0509050203000203" pitchFamily="49" charset="0"/>
+              </a:rPr>
+              <a:t>~</a:t>
+            </a:r>
+            <a:r>
+              <a:rPr lang="hu-HU" altLang="hu-HU" sz="2000" dirty="0" err="1">
+                <a:solidFill>
+                  <a:srgbClr val="D3BD99"/>
+                </a:solidFill>
+                <a:latin typeface="IBM Plex Mono" panose="020B0509050203000203" pitchFamily="49" charset="0"/>
+              </a:rPr>
+              <a:t>visitor_impl</a:t>
+            </a:r>
+            <a:r>
+              <a:rPr lang="hu-HU" altLang="hu-HU" sz="2000" dirty="0">
+                <a:solidFill>
+                  <a:srgbClr val="B5B6E3"/>
+                </a:solidFill>
+                <a:latin typeface="IBM Plex Mono" panose="020B0509050203000203" pitchFamily="49" charset="0"/>
+              </a:rPr>
+              <a:t>() </a:t>
+            </a:r>
+            <a:r>
+              <a:rPr lang="hu-HU" altLang="hu-HU" sz="2000" dirty="0" err="1">
+                <a:solidFill>
+                  <a:srgbClr val="A17C5D"/>
+                </a:solidFill>
+                <a:latin typeface="IBM Plex Mono" panose="020B0509050203000203" pitchFamily="49" charset="0"/>
+              </a:rPr>
+              <a:t>override</a:t>
+            </a:r>
+            <a:r>
+              <a:rPr kumimoji="0" lang="hu-HU" altLang="hu-HU" sz="2000" b="0" i="0" u="none" strike="noStrike" cap="none" normalizeH="0" baseline="0" dirty="0">
+                <a:ln>
+                  <a:noFill/>
+                </a:ln>
+                <a:solidFill>
+                  <a:srgbClr val="CFD2D5"/>
+                </a:solidFill>
+                <a:effectLst/>
+                <a:latin typeface="IBM Plex Mono" panose="020B0509050203000203" pitchFamily="49" charset="0"/>
+              </a:rPr>
+              <a:t> </a:t>
+            </a:r>
+            <a:r>
+              <a:rPr lang="hu-HU" altLang="hu-HU" sz="2000" dirty="0">
+                <a:solidFill>
+                  <a:srgbClr val="B5B6E3"/>
+                </a:solidFill>
+                <a:latin typeface="IBM Plex Mono" panose="020B0509050203000203" pitchFamily="49" charset="0"/>
+              </a:rPr>
+              <a:t>=</a:t>
+            </a:r>
+            <a:r>
+              <a:rPr kumimoji="0" lang="hu-HU" altLang="hu-HU" sz="2000" b="0" i="0" u="none" strike="noStrike" cap="none" normalizeH="0" baseline="0" dirty="0">
+                <a:ln>
+                  <a:noFill/>
+                </a:ln>
+                <a:solidFill>
+                  <a:srgbClr val="CFD2D5"/>
+                </a:solidFill>
+                <a:effectLst/>
+                <a:latin typeface="IBM Plex Mono" panose="020B0509050203000203" pitchFamily="49" charset="0"/>
+              </a:rPr>
+              <a:t> </a:t>
+            </a:r>
+            <a:r>
+              <a:rPr lang="hu-HU" altLang="hu-HU" sz="2000" dirty="0" err="1">
+                <a:solidFill>
+                  <a:srgbClr val="A17C5D"/>
+                </a:solidFill>
+                <a:latin typeface="IBM Plex Mono" panose="020B0509050203000203" pitchFamily="49" charset="0"/>
+              </a:rPr>
+              <a:t>default</a:t>
+            </a:r>
+            <a:r>
+              <a:rPr kumimoji="0" lang="hu-HU" altLang="hu-HU" sz="2000" b="0" i="0" u="none" strike="noStrike" cap="none" normalizeH="0" baseline="0" dirty="0">
+                <a:ln>
+                  <a:noFill/>
+                </a:ln>
+                <a:solidFill>
+                  <a:srgbClr val="CC7832"/>
+                </a:solidFill>
+                <a:effectLst/>
+                <a:latin typeface="IBM Plex Mono" panose="020B0509050203000203" pitchFamily="49" charset="0"/>
+              </a:rPr>
+              <a:t>;</a:t>
+            </a:r>
+            <a:br>
+              <a:rPr kumimoji="0" lang="hu-HU" altLang="hu-HU" sz="2000" b="0" i="0" u="none" strike="noStrike" cap="none" normalizeH="0" baseline="0" dirty="0">
+                <a:ln>
+                  <a:noFill/>
+                </a:ln>
+                <a:solidFill>
+                  <a:srgbClr val="CC7832"/>
+                </a:solidFill>
+                <a:effectLst/>
+                <a:latin typeface="IBM Plex Mono" panose="020B0509050203000203" pitchFamily="49" charset="0"/>
+              </a:rPr>
+            </a:br>
+            <a:r>
+              <a:rPr lang="hu-HU" altLang="hu-HU" sz="2000" dirty="0">
+                <a:solidFill>
+                  <a:srgbClr val="B5B6E3"/>
+                </a:solidFill>
+                <a:latin typeface="IBM Plex Mono" panose="020B0509050203000203" pitchFamily="49" charset="0"/>
+              </a:rPr>
+              <a:t>}</a:t>
+            </a:r>
+            <a:r>
+              <a:rPr kumimoji="0" lang="hu-HU" altLang="hu-HU" sz="2000" b="0" i="0" u="none" strike="noStrike" cap="none" normalizeH="0" baseline="0" dirty="0">
+                <a:ln>
+                  <a:noFill/>
+                </a:ln>
+                <a:solidFill>
+                  <a:srgbClr val="CC7832"/>
+                </a:solidFill>
+                <a:effectLst/>
+                <a:latin typeface="IBM Plex Mono" panose="020B0509050203000203" pitchFamily="49" charset="0"/>
+              </a:rPr>
+              <a:t>;</a:t>
+            </a:r>
+            <a:endParaRPr kumimoji="0" lang="hu-HU" altLang="hu-HU" sz="4400" b="0" i="0" u="none" strike="noStrike" cap="none" normalizeH="0" baseline="0" dirty="0">
+              <a:ln>
+                <a:noFill/>
+              </a:ln>
+              <a:solidFill>
+                <a:schemeClr val="tx1"/>
+              </a:solidFill>
+              <a:effectLst/>
+              <a:latin typeface="IBM Plex Mono" panose="020B0509050203000203" pitchFamily="49" charset="0"/>
+            </a:endParaRPr>
+          </a:p>
+        </p:txBody>
+      </p:sp>
     </p:spTree>
     <p:extLst>
       <p:ext uri="{BB962C8B-B14F-4D97-AF65-F5344CB8AC3E}">
@@ -30210,6 +31046,130 @@
   <p:clrMapOvr>
     <a:masterClrMapping/>
   </p:clrMapOvr>
+  <p:timing>
+    <p:tnLst>
+      <p:par>
+        <p:cTn id="1" dur="indefinite" restart="never" nodeType="tmRoot">
+          <p:childTnLst>
+            <p:seq concurrent="1" nextAc="seek">
+              <p:cTn id="2" dur="indefinite" nodeType="mainSeq">
+                <p:childTnLst>
+                  <p:par>
+                    <p:cTn id="3" fill="hold">
+                      <p:stCondLst>
+                        <p:cond delay="indefinite"/>
+                      </p:stCondLst>
+                      <p:childTnLst>
+                        <p:par>
+                          <p:cTn id="4" fill="hold">
+                            <p:stCondLst>
+                              <p:cond delay="0"/>
+                            </p:stCondLst>
+                            <p:childTnLst>
+                              <p:par>
+                                <p:cTn id="5" presetID="1" presetClass="entr" presetSubtype="0" fill="hold" grpId="0" nodeType="clickEffect">
+                                  <p:stCondLst>
+                                    <p:cond delay="0"/>
+                                  </p:stCondLst>
+                                  <p:childTnLst>
+                                    <p:set>
+                                      <p:cBhvr>
+                                        <p:cTn id="6" dur="1" fill="hold">
+                                          <p:stCondLst>
+                                            <p:cond delay="0"/>
+                                          </p:stCondLst>
+                                        </p:cTn>
+                                        <p:tgtEl>
+                                          <p:spTgt spid="5"/>
+                                        </p:tgtEl>
+                                        <p:attrNameLst>
+                                          <p:attrName>style.visibility</p:attrName>
+                                        </p:attrNameLst>
+                                      </p:cBhvr>
+                                      <p:to>
+                                        <p:strVal val="visible"/>
+                                      </p:to>
+                                    </p:set>
+                                  </p:childTnLst>
+                                </p:cTn>
+                              </p:par>
+                            </p:childTnLst>
+                          </p:cTn>
+                        </p:par>
+                      </p:childTnLst>
+                    </p:cTn>
+                  </p:par>
+                  <p:par>
+                    <p:cTn id="7" fill="hold">
+                      <p:stCondLst>
+                        <p:cond delay="indefinite"/>
+                      </p:stCondLst>
+                      <p:childTnLst>
+                        <p:par>
+                          <p:cTn id="8" fill="hold">
+                            <p:stCondLst>
+                              <p:cond delay="0"/>
+                            </p:stCondLst>
+                            <p:childTnLst>
+                              <p:par>
+                                <p:cTn id="9" presetID="1" presetClass="exit" presetSubtype="0" fill="hold" grpId="0" nodeType="clickEffect">
+                                  <p:stCondLst>
+                                    <p:cond delay="0"/>
+                                  </p:stCondLst>
+                                  <p:childTnLst>
+                                    <p:set>
+                                      <p:cBhvr>
+                                        <p:cTn id="10" dur="1" fill="hold">
+                                          <p:stCondLst>
+                                            <p:cond delay="0"/>
+                                          </p:stCondLst>
+                                        </p:cTn>
+                                        <p:tgtEl>
+                                          <p:spTgt spid="4"/>
+                                        </p:tgtEl>
+                                        <p:attrNameLst>
+                                          <p:attrName>style.visibility</p:attrName>
+                                        </p:attrNameLst>
+                                      </p:cBhvr>
+                                      <p:to>
+                                        <p:strVal val="hidden"/>
+                                      </p:to>
+                                    </p:set>
+                                  </p:childTnLst>
+                                </p:cTn>
+                              </p:par>
+                            </p:childTnLst>
+                          </p:cTn>
+                        </p:par>
+                      </p:childTnLst>
+                    </p:cTn>
+                  </p:par>
+                </p:childTnLst>
+              </p:cTn>
+              <p:prevCondLst>
+                <p:cond evt="onPrev" delay="0">
+                  <p:tgtEl>
+                    <p:sldTgt/>
+                  </p:tgtEl>
+                </p:cond>
+              </p:prevCondLst>
+              <p:nextCondLst>
+                <p:cond evt="onNext" delay="0">
+                  <p:tgtEl>
+                    <p:sldTgt/>
+                  </p:tgtEl>
+                </p:cond>
+              </p:nextCondLst>
+            </p:seq>
+          </p:childTnLst>
+        </p:cTn>
+      </p:par>
+    </p:tnLst>
+    <p:bldLst>
+      <p:bldP spid="4" grpId="0" animBg="1"/>
+      <p:bldP spid="5" grpId="0" animBg="1"/>
+    </p:bldLst>
+  </p:timing>
 </p:sld>
 </file>
 

</xml_diff>